<commit_message>
Update the Report and Presentation Slides
</commit_message>
<xml_diff>
--- a/Presentation.pptx
+++ b/Presentation.pptx
@@ -24,72 +24,73 @@
     <p:sldId id="269" r:id="rId20"/>
     <p:sldId id="270" r:id="rId21"/>
     <p:sldId id="271" r:id="rId22"/>
+    <p:sldId id="272" r:id="rId23"/>
   </p:sldIdLst>
   <p:sldSz cy="13716000" cx="24384000"/>
   <p:notesSz cx="6858000" cy="9144000"/>
   <p:embeddedFontLst>
     <p:embeddedFont>
       <p:font typeface="Raleway SemiBold"/>
-      <p:regular r:id="rId23"/>
-      <p:bold r:id="rId24"/>
-      <p:italic r:id="rId25"/>
-      <p:boldItalic r:id="rId26"/>
+      <p:regular r:id="rId24"/>
+      <p:bold r:id="rId25"/>
+      <p:italic r:id="rId26"/>
+      <p:boldItalic r:id="rId27"/>
     </p:embeddedFont>
     <p:embeddedFont>
       <p:font typeface="Roboto"/>
-      <p:regular r:id="rId27"/>
-      <p:bold r:id="rId28"/>
-      <p:italic r:id="rId29"/>
-      <p:boldItalic r:id="rId30"/>
+      <p:regular r:id="rId28"/>
+      <p:bold r:id="rId29"/>
+      <p:italic r:id="rId30"/>
+      <p:boldItalic r:id="rId31"/>
     </p:embeddedFont>
     <p:embeddedFont>
       <p:font typeface="Montserrat"/>
-      <p:regular r:id="rId31"/>
-      <p:bold r:id="rId32"/>
-      <p:italic r:id="rId33"/>
-      <p:boldItalic r:id="rId34"/>
+      <p:regular r:id="rId32"/>
+      <p:bold r:id="rId33"/>
+      <p:italic r:id="rId34"/>
+      <p:boldItalic r:id="rId35"/>
     </p:embeddedFont>
     <p:embeddedFont>
       <p:font typeface="Poppins"/>
-      <p:regular r:id="rId35"/>
-      <p:bold r:id="rId36"/>
-      <p:italic r:id="rId37"/>
-      <p:boldItalic r:id="rId38"/>
+      <p:regular r:id="rId36"/>
+      <p:bold r:id="rId37"/>
+      <p:italic r:id="rId38"/>
+      <p:boldItalic r:id="rId39"/>
     </p:embeddedFont>
     <p:embeddedFont>
       <p:font typeface="Open Sans SemiBold"/>
-      <p:regular r:id="rId39"/>
-      <p:bold r:id="rId40"/>
-      <p:italic r:id="rId41"/>
-      <p:boldItalic r:id="rId42"/>
+      <p:regular r:id="rId40"/>
+      <p:bold r:id="rId41"/>
+      <p:italic r:id="rId42"/>
+      <p:boldItalic r:id="rId43"/>
     </p:embeddedFont>
     <p:embeddedFont>
       <p:font typeface="Poppins Medium"/>
-      <p:regular r:id="rId43"/>
-      <p:bold r:id="rId44"/>
-      <p:italic r:id="rId45"/>
-      <p:boldItalic r:id="rId46"/>
+      <p:regular r:id="rId44"/>
+      <p:bold r:id="rId45"/>
+      <p:italic r:id="rId46"/>
+      <p:boldItalic r:id="rId47"/>
     </p:embeddedFont>
     <p:embeddedFont>
       <p:font typeface="Helvetica Neue"/>
-      <p:regular r:id="rId47"/>
-      <p:bold r:id="rId48"/>
-      <p:italic r:id="rId49"/>
-      <p:boldItalic r:id="rId50"/>
+      <p:regular r:id="rId48"/>
+      <p:bold r:id="rId49"/>
+      <p:italic r:id="rId50"/>
+      <p:boldItalic r:id="rId51"/>
     </p:embeddedFont>
     <p:embeddedFont>
       <p:font typeface="Open Sans"/>
-      <p:regular r:id="rId51"/>
-      <p:bold r:id="rId52"/>
-      <p:italic r:id="rId53"/>
-      <p:boldItalic r:id="rId54"/>
+      <p:regular r:id="rId52"/>
+      <p:bold r:id="rId53"/>
+      <p:italic r:id="rId54"/>
+      <p:boldItalic r:id="rId55"/>
     </p:embeddedFont>
     <p:embeddedFont>
       <p:font typeface="Century Gothic"/>
-      <p:regular r:id="rId55"/>
-      <p:bold r:id="rId56"/>
-      <p:italic r:id="rId57"/>
-      <p:boldItalic r:id="rId58"/>
+      <p:regular r:id="rId56"/>
+      <p:bold r:id="rId57"/>
+      <p:italic r:id="rId58"/>
+      <p:boldItalic r:id="rId59"/>
     </p:embeddedFont>
   </p:embeddedFontLst>
   <p:defaultTextStyle>
@@ -1477,7 +1478,7 @@
   <p:cSld>
     <p:spTree>
       <p:nvGrpSpPr>
-        <p:cNvPr id="182" name="Shape 182"/>
+        <p:cNvPr id="183" name="Shape 183"/>
         <p:cNvGrpSpPr/>
         <p:nvPr/>
       </p:nvGrpSpPr>
@@ -1491,7 +1492,7 @@
       </p:grpSpPr>
       <p:sp>
         <p:nvSpPr>
-          <p:cNvPr id="183" name="Google Shape;183;g28f548ac4f9_0_72:notes"/>
+          <p:cNvPr id="184" name="Google Shape;184;g28f548ac4f9_0_173:notes"/>
           <p:cNvSpPr txBox="1"/>
           <p:nvPr>
             <p:ph idx="1" type="body"/>
@@ -1538,7 +1539,7 @@
       </p:sp>
       <p:sp>
         <p:nvSpPr>
-          <p:cNvPr id="184" name="Google Shape;184;g28f548ac4f9_0_72:notes"/>
+          <p:cNvPr id="185" name="Google Shape;185;g28f548ac4f9_0_173:notes"/>
           <p:cNvSpPr/>
           <p:nvPr>
             <p:ph idx="2" type="sldImg"/>
@@ -1588,7 +1589,7 @@
   <p:cSld>
     <p:spTree>
       <p:nvGrpSpPr>
-        <p:cNvPr id="194" name="Shape 194"/>
+        <p:cNvPr id="195" name="Shape 195"/>
         <p:cNvGrpSpPr/>
         <p:nvPr/>
       </p:nvGrpSpPr>
@@ -1602,7 +1603,7 @@
       </p:grpSpPr>
       <p:sp>
         <p:nvSpPr>
-          <p:cNvPr id="195" name="Google Shape;195;p9:notes"/>
+          <p:cNvPr id="196" name="Google Shape;196;g28f548ac4f9_0_72:notes"/>
           <p:cNvSpPr txBox="1"/>
           <p:nvPr>
             <p:ph idx="1" type="body"/>
@@ -1649,7 +1650,7 @@
       </p:sp>
       <p:sp>
         <p:nvSpPr>
-          <p:cNvPr id="196" name="Google Shape;196;p9:notes"/>
+          <p:cNvPr id="197" name="Google Shape;197;g28f548ac4f9_0_72:notes"/>
           <p:cNvSpPr/>
           <p:nvPr>
             <p:ph idx="2" type="sldImg"/>
@@ -1699,7 +1700,7 @@
   <p:cSld>
     <p:spTree>
       <p:nvGrpSpPr>
-        <p:cNvPr id="205" name="Shape 205"/>
+        <p:cNvPr id="207" name="Shape 207"/>
         <p:cNvGrpSpPr/>
         <p:nvPr/>
       </p:nvGrpSpPr>
@@ -1713,7 +1714,118 @@
       </p:grpSpPr>
       <p:sp>
         <p:nvSpPr>
-          <p:cNvPr id="206" name="Google Shape;206;p13:notes"/>
+          <p:cNvPr id="208" name="Google Shape;208;p9:notes"/>
+          <p:cNvSpPr txBox="1"/>
+          <p:nvPr>
+            <p:ph idx="1" type="body"/>
+          </p:nvPr>
+        </p:nvSpPr>
+        <p:spPr>
+          <a:xfrm>
+            <a:off x="914400" y="4343400"/>
+            <a:ext cx="5029200" cy="4114800"/>
+          </a:xfrm>
+          <a:prstGeom prst="rect">
+            <a:avLst/>
+          </a:prstGeom>
+          <a:noFill/>
+          <a:ln>
+            <a:noFill/>
+          </a:ln>
+        </p:spPr>
+        <p:txBody>
+          <a:bodyPr anchorCtr="0" anchor="t" bIns="45700" lIns="91425" spcFirstLastPara="1" rIns="91425" wrap="square" tIns="45700">
+            <a:noAutofit/>
+          </a:bodyPr>
+          <a:lstStyle/>
+          <a:p>
+            <a:pPr indent="0" lvl="0" marL="0" rtl="0" algn="l">
+              <a:lnSpc>
+                <a:spcPct val="117000"/>
+              </a:lnSpc>
+              <a:spcBef>
+                <a:spcPts val="0"/>
+              </a:spcBef>
+              <a:spcAft>
+                <a:spcPts val="0"/>
+              </a:spcAft>
+              <a:buSzPts val="1400"/>
+              <a:buNone/>
+            </a:pPr>
+            <a:r>
+              <a:t/>
+            </a:r>
+            <a:endParaRPr/>
+          </a:p>
+        </p:txBody>
+      </p:sp>
+      <p:sp>
+        <p:nvSpPr>
+          <p:cNvPr id="209" name="Google Shape;209;p9:notes"/>
+          <p:cNvSpPr/>
+          <p:nvPr>
+            <p:ph idx="2" type="sldImg"/>
+          </p:nvPr>
+        </p:nvSpPr>
+        <p:spPr>
+          <a:xfrm>
+            <a:off x="381000" y="685800"/>
+            <a:ext cx="6096000" cy="3429000"/>
+          </a:xfrm>
+          <a:custGeom>
+            <a:rect b="b" l="l" r="r" t="t"/>
+            <a:pathLst>
+              <a:path extrusionOk="0" h="120000" w="120000">
+                <a:moveTo>
+                  <a:pt x="0" y="0"/>
+                </a:moveTo>
+                <a:lnTo>
+                  <a:pt x="120000" y="0"/>
+                </a:lnTo>
+                <a:lnTo>
+                  <a:pt x="120000" y="120000"/>
+                </a:lnTo>
+                <a:lnTo>
+                  <a:pt x="0" y="120000"/>
+                </a:lnTo>
+                <a:close/>
+              </a:path>
+            </a:pathLst>
+          </a:custGeom>
+          <a:noFill/>
+          <a:ln>
+            <a:noFill/>
+          </a:ln>
+        </p:spPr>
+      </p:sp>
+    </p:spTree>
+  </p:cSld>
+  <p:clrMapOvr>
+    <a:masterClrMapping/>
+  </p:clrMapOvr>
+</p:notes>
+</file>
+
+<file path=ppt/notesSlides/notesSlide17.xml><?xml version="1.0" encoding="utf-8"?>
+<p:notes xmlns:a="http://schemas.openxmlformats.org/drawingml/2006/main" xmlns:r="http://schemas.openxmlformats.org/officeDocument/2006/relationships" xmlns:mc="http://schemas.openxmlformats.org/markup-compatibility/2006" xmlns:mv="urn:schemas-microsoft-com:mac:vml" xmlns:p="http://schemas.openxmlformats.org/presentationml/2006/main" xmlns:c="http://schemas.openxmlformats.org/drawingml/2006/chart" xmlns:dgm="http://schemas.openxmlformats.org/drawingml/2006/diagram" xmlns:o="urn:schemas-microsoft-com:office:office" xmlns:v="urn:schemas-microsoft-com:vml" xmlns:pvml="urn:schemas-microsoft-com:office:powerpoint" xmlns:com="http://schemas.openxmlformats.org/drawingml/2006/compatibility" xmlns:p14="http://schemas.microsoft.com/office/powerpoint/2010/main" xmlns:p15="http://schemas.microsoft.com/office/powerpoint/2012/main" xmlns:ahyp="http://schemas.microsoft.com/office/drawing/2018/hyperlinkcolor" showMasterPhAnim="0" showMasterSp="0">
+  <p:cSld>
+    <p:spTree>
+      <p:nvGrpSpPr>
+        <p:cNvPr id="218" name="Shape 218"/>
+        <p:cNvGrpSpPr/>
+        <p:nvPr/>
+      </p:nvGrpSpPr>
+      <p:grpSpPr>
+        <a:xfrm>
+          <a:off x="0" y="0"/>
+          <a:ext cx="0" cy="0"/>
+          <a:chOff x="0" y="0"/>
+          <a:chExt cx="0" cy="0"/>
+        </a:xfrm>
+      </p:grpSpPr>
+      <p:sp>
+        <p:nvSpPr>
+          <p:cNvPr id="219" name="Google Shape;219;p13:notes"/>
           <p:cNvSpPr/>
           <p:nvPr>
             <p:ph idx="2" type="sldImg"/>
@@ -1752,7 +1864,7 @@
       </p:sp>
       <p:sp>
         <p:nvSpPr>
-          <p:cNvPr id="207" name="Google Shape;207;p13:notes"/>
+          <p:cNvPr id="220" name="Google Shape;220;p13:notes"/>
           <p:cNvSpPr txBox="1"/>
           <p:nvPr>
             <p:ph idx="1" type="body"/>
@@ -9060,6 +9172,34 @@
               </a:rPr>
               <a:t>Train Test Split: </a:t>
             </a:r>
+            <a:endParaRPr b="1" sz="4000">
+              <a:solidFill>
+                <a:srgbClr val="292829"/>
+              </a:solidFill>
+              <a:latin typeface="Century Gothic"/>
+              <a:ea typeface="Century Gothic"/>
+              <a:cs typeface="Century Gothic"/>
+              <a:sym typeface="Century Gothic"/>
+            </a:endParaRPr>
+          </a:p>
+          <a:p>
+            <a:pPr indent="-482600" lvl="1" marL="914400" marR="0" rtl="0" algn="l">
+              <a:lnSpc>
+                <a:spcPct val="180000"/>
+              </a:lnSpc>
+              <a:spcBef>
+                <a:spcPts val="0"/>
+              </a:spcBef>
+              <a:spcAft>
+                <a:spcPts val="0"/>
+              </a:spcAft>
+              <a:buClr>
+                <a:srgbClr val="292829"/>
+              </a:buClr>
+              <a:buSzPts val="4000"/>
+              <a:buFont typeface="Century Gothic"/>
+              <a:buChar char="○"/>
+            </a:pPr>
             <a:r>
               <a:rPr lang="en-US" sz="4000">
                 <a:solidFill>
@@ -9070,7 +9210,47 @@
                 <a:cs typeface="Century Gothic"/>
                 <a:sym typeface="Century Gothic"/>
               </a:rPr>
-              <a:t>80 20 %</a:t>
+              <a:t>With 80 20 % Split</a:t>
+            </a:r>
+            <a:endParaRPr sz="4000">
+              <a:solidFill>
+                <a:srgbClr val="292829"/>
+              </a:solidFill>
+              <a:latin typeface="Century Gothic"/>
+              <a:ea typeface="Century Gothic"/>
+              <a:cs typeface="Century Gothic"/>
+              <a:sym typeface="Century Gothic"/>
+            </a:endParaRPr>
+          </a:p>
+          <a:p>
+            <a:pPr indent="-482600" lvl="1" marL="914400" marR="0" rtl="0" algn="l">
+              <a:lnSpc>
+                <a:spcPct val="180000"/>
+              </a:lnSpc>
+              <a:spcBef>
+                <a:spcPts val="0"/>
+              </a:spcBef>
+              <a:spcAft>
+                <a:spcPts val="0"/>
+              </a:spcAft>
+              <a:buClr>
+                <a:srgbClr val="292829"/>
+              </a:buClr>
+              <a:buSzPts val="4000"/>
+              <a:buFont typeface="Century Gothic"/>
+              <a:buChar char="○"/>
+            </a:pPr>
+            <a:r>
+              <a:rPr lang="en-US" sz="4000">
+                <a:solidFill>
+                  <a:srgbClr val="292829"/>
+                </a:solidFill>
+                <a:latin typeface="Century Gothic"/>
+                <a:ea typeface="Century Gothic"/>
+                <a:cs typeface="Century Gothic"/>
+                <a:sym typeface="Century Gothic"/>
+              </a:rPr>
+              <a:t>With 85 25&amp; Split</a:t>
             </a:r>
             <a:endParaRPr sz="4000">
               <a:solidFill>
@@ -9553,7 +9733,7 @@
         </p:nvSpPr>
         <p:spPr>
           <a:xfrm>
-            <a:off x="1396325" y="565450"/>
+            <a:off x="1396313" y="2894900"/>
             <a:ext cx="19723800" cy="1299000"/>
           </a:xfrm>
           <a:prstGeom prst="rect">
@@ -9666,18 +9846,17 @@
           <p:cNvPicPr preferRelativeResize="0"/>
           <p:nvPr/>
         </p:nvPicPr>
-        <p:blipFill>
+        <p:blipFill rotWithShape="1">
           <a:blip r:embed="rId4">
             <a:alphaModFix/>
           </a:blip>
-          <a:stretch>
-            <a:fillRect/>
-          </a:stretch>
+          <a:srcRect b="0" l="544" r="534" t="0"/>
+          <a:stretch/>
         </p:blipFill>
         <p:spPr>
           <a:xfrm>
-            <a:off x="3950500" y="1553900"/>
-            <a:ext cx="14615450" cy="5025950"/>
+            <a:off x="4677062" y="8772300"/>
+            <a:ext cx="13162324" cy="4526250"/>
           </a:xfrm>
           <a:prstGeom prst="rect">
             <a:avLst/>
@@ -9810,7 +9989,7 @@
         </p:nvSpPr>
         <p:spPr>
           <a:xfrm>
-            <a:off x="1396325" y="7473300"/>
+            <a:off x="1396313" y="8024150"/>
             <a:ext cx="19723800" cy="1299000"/>
           </a:xfrm>
           <a:prstGeom prst="rect">
@@ -9869,18 +10048,17 @@
           <p:cNvPicPr preferRelativeResize="0"/>
           <p:nvPr/>
         </p:nvPicPr>
-        <p:blipFill>
-          <a:blip r:embed="rId4">
+        <p:blipFill rotWithShape="1">
+          <a:blip r:embed="rId5">
             <a:alphaModFix/>
           </a:blip>
-          <a:stretch>
-            <a:fillRect/>
-          </a:stretch>
+          <a:srcRect b="0" l="816" r="806" t="0"/>
+          <a:stretch/>
         </p:blipFill>
         <p:spPr>
           <a:xfrm>
-            <a:off x="3950500" y="8461750"/>
-            <a:ext cx="14615450" cy="5025950"/>
+            <a:off x="4677062" y="3401950"/>
+            <a:ext cx="13162323" cy="4526250"/>
           </a:xfrm>
           <a:prstGeom prst="rect">
             <a:avLst/>
@@ -9891,6 +10069,120 @@
           </a:ln>
         </p:spPr>
       </p:pic>
+      <p:sp>
+        <p:nvSpPr>
+          <p:cNvPr id="182" name="Google Shape;182;p20"/>
+          <p:cNvSpPr txBox="1"/>
+          <p:nvPr/>
+        </p:nvSpPr>
+        <p:spPr>
+          <a:xfrm>
+            <a:off x="1396325" y="1421000"/>
+            <a:ext cx="18019200" cy="1296600"/>
+          </a:xfrm>
+          <a:prstGeom prst="rect">
+            <a:avLst/>
+          </a:prstGeom>
+          <a:noFill/>
+          <a:ln>
+            <a:noFill/>
+          </a:ln>
+        </p:spPr>
+        <p:txBody>
+          <a:bodyPr anchorCtr="0" anchor="t" bIns="38100" lIns="38100" spcFirstLastPara="1" rIns="38100" wrap="square" tIns="38100">
+            <a:noAutofit/>
+          </a:bodyPr>
+          <a:lstStyle/>
+          <a:p>
+            <a:pPr indent="0" lvl="0" marL="0" marR="0" rtl="0" algn="l">
+              <a:lnSpc>
+                <a:spcPct val="100000"/>
+              </a:lnSpc>
+              <a:spcBef>
+                <a:spcPts val="0"/>
+              </a:spcBef>
+              <a:spcAft>
+                <a:spcPts val="0"/>
+              </a:spcAft>
+              <a:buClr>
+                <a:srgbClr val="000000"/>
+              </a:buClr>
+              <a:buSzPts val="6000"/>
+              <a:buFont typeface="Arial"/>
+              <a:buNone/>
+            </a:pPr>
+            <a:r>
+              <a:rPr b="1" lang="en-US" sz="7000">
+                <a:solidFill>
+                  <a:srgbClr val="406FFD"/>
+                </a:solidFill>
+                <a:latin typeface="Montserrat"/>
+                <a:ea typeface="Montserrat"/>
+                <a:cs typeface="Montserrat"/>
+                <a:sym typeface="Montserrat"/>
+              </a:rPr>
+              <a:t>Evaluation (0n 8</a:t>
+            </a:r>
+            <a:r>
+              <a:rPr b="1" lang="en-US" sz="7000">
+                <a:solidFill>
+                  <a:srgbClr val="406FFD"/>
+                </a:solidFill>
+                <a:latin typeface="Montserrat"/>
+                <a:ea typeface="Montserrat"/>
+                <a:cs typeface="Montserrat"/>
+                <a:sym typeface="Montserrat"/>
+              </a:rPr>
+              <a:t>0</a:t>
+            </a:r>
+            <a:r>
+              <a:rPr b="1" lang="en-US" sz="7000">
+                <a:solidFill>
+                  <a:srgbClr val="406FFD"/>
+                </a:solidFill>
+                <a:latin typeface="Montserrat"/>
+                <a:ea typeface="Montserrat"/>
+                <a:cs typeface="Montserrat"/>
+                <a:sym typeface="Montserrat"/>
+              </a:rPr>
+              <a:t> </a:t>
+            </a:r>
+            <a:r>
+              <a:rPr b="1" lang="en-US" sz="7000">
+                <a:solidFill>
+                  <a:srgbClr val="406FFD"/>
+                </a:solidFill>
+                <a:latin typeface="Montserrat"/>
+                <a:ea typeface="Montserrat"/>
+                <a:cs typeface="Montserrat"/>
+                <a:sym typeface="Montserrat"/>
+              </a:rPr>
+              <a:t>20</a:t>
+            </a:r>
+            <a:r>
+              <a:rPr b="1" lang="en-US" sz="7000">
+                <a:solidFill>
+                  <a:srgbClr val="406FFD"/>
+                </a:solidFill>
+                <a:latin typeface="Montserrat"/>
+                <a:ea typeface="Montserrat"/>
+                <a:cs typeface="Montserrat"/>
+                <a:sym typeface="Montserrat"/>
+              </a:rPr>
+              <a:t> Split)</a:t>
+            </a:r>
+            <a:endParaRPr b="1" i="0" sz="7000" u="none" cap="none" strike="noStrike">
+              <a:solidFill>
+                <a:srgbClr val="FF0000"/>
+              </a:solidFill>
+              <a:latin typeface="Montserrat"/>
+              <a:ea typeface="Montserrat"/>
+              <a:cs typeface="Montserrat"/>
+              <a:sym typeface="Montserrat"/>
+            </a:endParaRPr>
+          </a:p>
+        </p:txBody>
+      </p:sp>
     </p:spTree>
   </p:cSld>
   <p:clrMapOvr>
@@ -9955,7 +10247,7 @@
                                 </p:cTn>
                               </p:par>
                               <p:par>
-                                <p:cTn fill="hold" nodeType="withEffect" presetClass="entr" presetID="10" presetSubtype="0">
+                                <p:cTn fill="hold" nodeType="withEffect" presetClass="entr" presetID="1" presetSubtype="0">
                                   <p:stCondLst>
                                     <p:cond delay="0"/>
                                   </p:stCondLst>
@@ -9968,7 +10260,7 @@
                                           </p:stCondLst>
                                         </p:cTn>
                                         <p:tgtEl>
-                                          <p:spTgt spid="177"/>
+                                          <p:spTgt spid="181"/>
                                         </p:tgtEl>
                                         <p:attrNameLst>
                                           <p:attrName>style.visibility</p:attrName>
@@ -9978,14 +10270,6 @@
                                         <p:strVal val="visible"/>
                                       </p:to>
                                     </p:set>
-                                    <p:animEffect filter="fade" transition="in">
-                                      <p:cBhvr>
-                                        <p:cTn dur="1000"/>
-                                        <p:tgtEl>
-                                          <p:spTgt spid="177"/>
-                                        </p:tgtEl>
-                                      </p:cBhvr>
-                                    </p:animEffect>
                                   </p:childTnLst>
                                 </p:cTn>
                               </p:par>
@@ -10056,7 +10340,7 @@
                                           </p:stCondLst>
                                         </p:cTn>
                                         <p:tgtEl>
-                                          <p:spTgt spid="181"/>
+                                          <p:spTgt spid="177"/>
                                         </p:tgtEl>
                                         <p:attrNameLst>
                                           <p:attrName>style.visibility</p:attrName>
@@ -10070,7 +10354,7 @@
                                       <p:cBhvr>
                                         <p:cTn dur="1000"/>
                                         <p:tgtEl>
-                                          <p:spTgt spid="181"/>
+                                          <p:spTgt spid="177"/>
                                         </p:tgtEl>
                                       </p:cBhvr>
                                     </p:animEffect>
@@ -10113,7 +10397,7 @@
   <p:cSld>
     <p:spTree>
       <p:nvGrpSpPr>
-        <p:cNvPr id="185" name="Shape 185"/>
+        <p:cNvPr id="186" name="Shape 186"/>
         <p:cNvGrpSpPr/>
         <p:nvPr/>
       </p:nvGrpSpPr>
@@ -10127,7 +10411,7 @@
       </p:grpSpPr>
       <p:sp>
         <p:nvSpPr>
-          <p:cNvPr id="186" name="Google Shape;186;p21"/>
+          <p:cNvPr id="187" name="Google Shape;187;p21"/>
           <p:cNvSpPr txBox="1"/>
           <p:nvPr/>
         </p:nvSpPr>
@@ -10193,7 +10477,7 @@
       </p:sp>
       <p:sp>
         <p:nvSpPr>
-          <p:cNvPr id="187" name="Google Shape;187;p21"/>
+          <p:cNvPr id="188" name="Google Shape;188;p21"/>
           <p:cNvSpPr/>
           <p:nvPr/>
         </p:nvSpPr>
@@ -10250,7 +10534,7 @@
       </p:sp>
       <p:sp>
         <p:nvSpPr>
-          <p:cNvPr id="188" name="Google Shape;188;p21"/>
+          <p:cNvPr id="189" name="Google Shape;189;p21"/>
           <p:cNvSpPr/>
           <p:nvPr/>
         </p:nvSpPr>
@@ -10307,80 +10591,14 @@
       </p:sp>
       <p:sp>
         <p:nvSpPr>
-          <p:cNvPr id="189" name="Google Shape;189;p21"/>
-          <p:cNvSpPr txBox="1"/>
-          <p:nvPr/>
-        </p:nvSpPr>
-        <p:spPr>
-          <a:xfrm>
-            <a:off x="1396325" y="1421000"/>
-            <a:ext cx="18019200" cy="1296600"/>
-          </a:xfrm>
-          <a:prstGeom prst="rect">
-            <a:avLst/>
-          </a:prstGeom>
-          <a:noFill/>
-          <a:ln>
-            <a:noFill/>
-          </a:ln>
-        </p:spPr>
-        <p:txBody>
-          <a:bodyPr anchorCtr="0" anchor="t" bIns="38100" lIns="38100" spcFirstLastPara="1" rIns="38100" wrap="square" tIns="38100">
-            <a:noAutofit/>
-          </a:bodyPr>
-          <a:lstStyle/>
-          <a:p>
-            <a:pPr indent="0" lvl="0" marL="0" marR="0" rtl="0" algn="l">
-              <a:lnSpc>
-                <a:spcPct val="100000"/>
-              </a:lnSpc>
-              <a:spcBef>
-                <a:spcPts val="0"/>
-              </a:spcBef>
-              <a:spcAft>
-                <a:spcPts val="0"/>
-              </a:spcAft>
-              <a:buClr>
-                <a:srgbClr val="000000"/>
-              </a:buClr>
-              <a:buSzPts val="6000"/>
-              <a:buFont typeface="Arial"/>
-              <a:buNone/>
-            </a:pPr>
-            <a:r>
-              <a:rPr b="1" lang="en-US" sz="7000">
-                <a:solidFill>
-                  <a:srgbClr val="406FFD"/>
-                </a:solidFill>
-                <a:latin typeface="Montserrat"/>
-                <a:ea typeface="Montserrat"/>
-                <a:cs typeface="Montserrat"/>
-                <a:sym typeface="Montserrat"/>
-              </a:rPr>
-              <a:t>Project Management</a:t>
-            </a:r>
-            <a:endParaRPr b="1" i="0" sz="7000" u="none" cap="none" strike="noStrike">
-              <a:solidFill>
-                <a:srgbClr val="FF0000"/>
-              </a:solidFill>
-              <a:latin typeface="Montserrat"/>
-              <a:ea typeface="Montserrat"/>
-              <a:cs typeface="Montserrat"/>
-              <a:sym typeface="Montserrat"/>
-            </a:endParaRPr>
-          </a:p>
-        </p:txBody>
-      </p:sp>
-      <p:sp>
-        <p:nvSpPr>
           <p:cNvPr id="190" name="Google Shape;190;p21"/>
           <p:cNvSpPr/>
           <p:nvPr/>
         </p:nvSpPr>
         <p:spPr>
           <a:xfrm>
-            <a:off x="1949950" y="4507350"/>
-            <a:ext cx="19062900" cy="6576000"/>
+            <a:off x="1396300" y="3831200"/>
+            <a:ext cx="19723800" cy="1299000"/>
           </a:xfrm>
           <a:prstGeom prst="rect">
             <a:avLst/>
@@ -10396,7 +10614,7 @@
           </a:bodyPr>
           <a:lstStyle/>
           <a:p>
-            <a:pPr indent="-292100" lvl="0" marL="342900" marR="0" rtl="0" algn="l">
+            <a:pPr indent="0" lvl="0" marL="457200" marR="0" rtl="0" algn="l">
               <a:lnSpc>
                 <a:spcPct val="180000"/>
               </a:lnSpc>
@@ -10406,15 +10624,10 @@
               <a:spcAft>
                 <a:spcPts val="0"/>
               </a:spcAft>
-              <a:buClr>
-                <a:srgbClr val="292829"/>
-              </a:buClr>
-              <a:buSzPts val="4000"/>
-              <a:buFont typeface="Century Gothic"/>
-              <a:buChar char="•"/>
+              <a:buNone/>
             </a:pPr>
             <a:r>
-              <a:rPr lang="en-US" sz="4000">
+              <a:rPr b="1" lang="en-US" sz="4000">
                 <a:solidFill>
                   <a:srgbClr val="292829"/>
                 </a:solidFill>
@@ -10423,190 +10636,7 @@
                 <a:cs typeface="Century Gothic"/>
                 <a:sym typeface="Century Gothic"/>
               </a:rPr>
-              <a:t>Entire Project was managed </a:t>
-            </a:r>
-            <a:endParaRPr sz="4000">
-              <a:solidFill>
-                <a:srgbClr val="292829"/>
-              </a:solidFill>
-              <a:latin typeface="Century Gothic"/>
-              <a:ea typeface="Century Gothic"/>
-              <a:cs typeface="Century Gothic"/>
-              <a:sym typeface="Century Gothic"/>
-            </a:endParaRPr>
-          </a:p>
-          <a:p>
-            <a:pPr indent="0" lvl="0" marL="457200" marR="0" rtl="0" algn="l">
-              <a:lnSpc>
-                <a:spcPct val="180000"/>
-              </a:lnSpc>
-              <a:spcBef>
-                <a:spcPts val="0"/>
-              </a:spcBef>
-              <a:spcAft>
-                <a:spcPts val="0"/>
-              </a:spcAft>
-              <a:buNone/>
-            </a:pPr>
-            <a:r>
-              <a:rPr lang="en-US" sz="4000">
-                <a:solidFill>
-                  <a:srgbClr val="292829"/>
-                </a:solidFill>
-                <a:latin typeface="Century Gothic"/>
-                <a:ea typeface="Century Gothic"/>
-                <a:cs typeface="Century Gothic"/>
-                <a:sym typeface="Century Gothic"/>
-              </a:rPr>
-              <a:t>on Github.</a:t>
-            </a:r>
-            <a:endParaRPr sz="4000">
-              <a:solidFill>
-                <a:srgbClr val="292829"/>
-              </a:solidFill>
-              <a:latin typeface="Century Gothic"/>
-              <a:ea typeface="Century Gothic"/>
-              <a:cs typeface="Century Gothic"/>
-              <a:sym typeface="Century Gothic"/>
-            </a:endParaRPr>
-          </a:p>
-          <a:p>
-            <a:pPr indent="-292100" lvl="0" marL="342900" marR="0" rtl="0" algn="l">
-              <a:lnSpc>
-                <a:spcPct val="180000"/>
-              </a:lnSpc>
-              <a:spcBef>
-                <a:spcPts val="0"/>
-              </a:spcBef>
-              <a:spcAft>
-                <a:spcPts val="0"/>
-              </a:spcAft>
-              <a:buClr>
-                <a:srgbClr val="292829"/>
-              </a:buClr>
-              <a:buSzPts val="4000"/>
-              <a:buFont typeface="Century Gothic"/>
-              <a:buChar char="•"/>
-            </a:pPr>
-            <a:r>
-              <a:rPr lang="en-US" sz="4000">
-                <a:solidFill>
-                  <a:srgbClr val="292829"/>
-                </a:solidFill>
-                <a:latin typeface="Century Gothic"/>
-                <a:ea typeface="Century Gothic"/>
-                <a:cs typeface="Century Gothic"/>
-                <a:sym typeface="Century Gothic"/>
-              </a:rPr>
-              <a:t>Issues were created, each </a:t>
-            </a:r>
-            <a:endParaRPr sz="4000">
-              <a:solidFill>
-                <a:srgbClr val="292829"/>
-              </a:solidFill>
-              <a:latin typeface="Century Gothic"/>
-              <a:ea typeface="Century Gothic"/>
-              <a:cs typeface="Century Gothic"/>
-              <a:sym typeface="Century Gothic"/>
-            </a:endParaRPr>
-          </a:p>
-          <a:p>
-            <a:pPr indent="0" lvl="0" marL="457200" marR="0" rtl="0" algn="l">
-              <a:lnSpc>
-                <a:spcPct val="180000"/>
-              </a:lnSpc>
-              <a:spcBef>
-                <a:spcPts val="0"/>
-              </a:spcBef>
-              <a:spcAft>
-                <a:spcPts val="0"/>
-              </a:spcAft>
-              <a:buNone/>
-            </a:pPr>
-            <a:r>
-              <a:rPr lang="en-US" sz="4000">
-                <a:solidFill>
-                  <a:srgbClr val="292829"/>
-                </a:solidFill>
-                <a:latin typeface="Century Gothic"/>
-                <a:ea typeface="Century Gothic"/>
-                <a:cs typeface="Century Gothic"/>
-                <a:sym typeface="Century Gothic"/>
-              </a:rPr>
-              <a:t>primarily</a:t>
-            </a:r>
-            <a:r>
-              <a:rPr lang="en-US" sz="4000">
-                <a:solidFill>
-                  <a:srgbClr val="292829"/>
-                </a:solidFill>
-                <a:latin typeface="Century Gothic"/>
-                <a:ea typeface="Century Gothic"/>
-                <a:cs typeface="Century Gothic"/>
-                <a:sym typeface="Century Gothic"/>
-              </a:rPr>
-              <a:t> acting as a </a:t>
-            </a:r>
-            <a:endParaRPr sz="4000">
-              <a:solidFill>
-                <a:srgbClr val="292829"/>
-              </a:solidFill>
-              <a:latin typeface="Century Gothic"/>
-              <a:ea typeface="Century Gothic"/>
-              <a:cs typeface="Century Gothic"/>
-              <a:sym typeface="Century Gothic"/>
-            </a:endParaRPr>
-          </a:p>
-          <a:p>
-            <a:pPr indent="0" lvl="0" marL="457200" marR="0" rtl="0" algn="l">
-              <a:lnSpc>
-                <a:spcPct val="180000"/>
-              </a:lnSpc>
-              <a:spcBef>
-                <a:spcPts val="0"/>
-              </a:spcBef>
-              <a:spcAft>
-                <a:spcPts val="0"/>
-              </a:spcAft>
-              <a:buNone/>
-            </a:pPr>
-            <a:r>
-              <a:rPr lang="en-US" sz="4000">
-                <a:solidFill>
-                  <a:srgbClr val="292829"/>
-                </a:solidFill>
-                <a:latin typeface="Century Gothic"/>
-                <a:ea typeface="Century Gothic"/>
-                <a:cs typeface="Century Gothic"/>
-                <a:sym typeface="Century Gothic"/>
-              </a:rPr>
-              <a:t>milestone.</a:t>
-            </a:r>
-            <a:endParaRPr sz="4000">
-              <a:solidFill>
-                <a:srgbClr val="292829"/>
-              </a:solidFill>
-              <a:latin typeface="Century Gothic"/>
-              <a:ea typeface="Century Gothic"/>
-              <a:cs typeface="Century Gothic"/>
-              <a:sym typeface="Century Gothic"/>
-            </a:endParaRPr>
-          </a:p>
-          <a:p>
-            <a:pPr indent="0" lvl="0" marL="457200" marR="0" rtl="0" algn="l">
-              <a:lnSpc>
-                <a:spcPct val="180000"/>
-              </a:lnSpc>
-              <a:spcBef>
-                <a:spcPts val="0"/>
-              </a:spcBef>
-              <a:spcAft>
-                <a:spcPts val="0"/>
-              </a:spcAft>
-              <a:buNone/>
-            </a:pPr>
-            <a:r>
-              <a:t/>
+              <a:t>With Graph:</a:t>
             </a:r>
             <a:endParaRPr sz="4000">
               <a:solidFill>
@@ -10690,8 +10720,8 @@
         </p:blipFill>
         <p:spPr>
           <a:xfrm>
-            <a:off x="10735475" y="3143475"/>
-            <a:ext cx="12254476" cy="9521517"/>
+            <a:off x="4218835" y="5268163"/>
+            <a:ext cx="15946332" cy="5483613"/>
           </a:xfrm>
           <a:prstGeom prst="rect">
             <a:avLst/>
@@ -10702,6 +10732,72 @@
           </a:ln>
         </p:spPr>
       </p:pic>
+      <p:sp>
+        <p:nvSpPr>
+          <p:cNvPr id="194" name="Google Shape;194;p21"/>
+          <p:cNvSpPr txBox="1"/>
+          <p:nvPr/>
+        </p:nvSpPr>
+        <p:spPr>
+          <a:xfrm>
+            <a:off x="1396325" y="1421000"/>
+            <a:ext cx="18019200" cy="1296600"/>
+          </a:xfrm>
+          <a:prstGeom prst="rect">
+            <a:avLst/>
+          </a:prstGeom>
+          <a:noFill/>
+          <a:ln>
+            <a:noFill/>
+          </a:ln>
+        </p:spPr>
+        <p:txBody>
+          <a:bodyPr anchorCtr="0" anchor="t" bIns="38100" lIns="38100" spcFirstLastPara="1" rIns="38100" wrap="square" tIns="38100">
+            <a:noAutofit/>
+          </a:bodyPr>
+          <a:lstStyle/>
+          <a:p>
+            <a:pPr indent="0" lvl="0" marL="0" marR="0" rtl="0" algn="l">
+              <a:lnSpc>
+                <a:spcPct val="100000"/>
+              </a:lnSpc>
+              <a:spcBef>
+                <a:spcPts val="0"/>
+              </a:spcBef>
+              <a:spcAft>
+                <a:spcPts val="0"/>
+              </a:spcAft>
+              <a:buClr>
+                <a:srgbClr val="000000"/>
+              </a:buClr>
+              <a:buSzPts val="6000"/>
+              <a:buFont typeface="Arial"/>
+              <a:buNone/>
+            </a:pPr>
+            <a:r>
+              <a:rPr b="1" lang="en-US" sz="7000">
+                <a:solidFill>
+                  <a:srgbClr val="406FFD"/>
+                </a:solidFill>
+                <a:latin typeface="Montserrat"/>
+                <a:ea typeface="Montserrat"/>
+                <a:cs typeface="Montserrat"/>
+                <a:sym typeface="Montserrat"/>
+              </a:rPr>
+              <a:t>Evaluation (0n 85 25 Split)</a:t>
+            </a:r>
+            <a:endParaRPr b="1" i="0" sz="7000" u="none" cap="none" strike="noStrike">
+              <a:solidFill>
+                <a:srgbClr val="FF0000"/>
+              </a:solidFill>
+              <a:latin typeface="Montserrat"/>
+              <a:ea typeface="Montserrat"/>
+              <a:cs typeface="Montserrat"/>
+              <a:sym typeface="Montserrat"/>
+            </a:endParaRPr>
+          </a:p>
+        </p:txBody>
+      </p:sp>
     </p:spTree>
   </p:cSld>
   <p:clrMapOvr>
@@ -10765,26 +10861,8 @@
                                   </p:childTnLst>
                                 </p:cTn>
                               </p:par>
-                            </p:childTnLst>
-                          </p:cTn>
-                        </p:par>
-                      </p:childTnLst>
-                    </p:cTn>
-                  </p:par>
-                  <p:par>
-                    <p:cTn fill="hold">
-                      <p:stCondLst>
-                        <p:cond delay="indefinite"/>
-                      </p:stCondLst>
-                      <p:childTnLst>
-                        <p:par>
-                          <p:cTn fill="hold">
-                            <p:stCondLst>
-                              <p:cond delay="0"/>
-                            </p:stCondLst>
-                            <p:childTnLst>
                               <p:par>
-                                <p:cTn fill="hold" nodeType="clickEffect" presetClass="entr" presetID="1" presetSubtype="0">
+                                <p:cTn fill="hold" nodeType="withEffect" presetClass="entr" presetID="1" presetSubtype="0">
                                   <p:stCondLst>
                                     <p:cond delay="0"/>
                                   </p:stCondLst>
@@ -10846,7 +10924,7 @@
   <p:cSld>
     <p:spTree>
       <p:nvGrpSpPr>
-        <p:cNvPr id="197" name="Shape 197"/>
+        <p:cNvPr id="198" name="Shape 198"/>
         <p:cNvGrpSpPr/>
         <p:nvPr/>
       </p:nvGrpSpPr>
@@ -10860,7 +10938,740 @@
       </p:grpSpPr>
       <p:sp>
         <p:nvSpPr>
-          <p:cNvPr id="198" name="Google Shape;198;p22"/>
+          <p:cNvPr id="199" name="Google Shape;199;p22"/>
+          <p:cNvSpPr txBox="1"/>
+          <p:nvPr/>
+        </p:nvSpPr>
+        <p:spPr>
+          <a:xfrm>
+            <a:off x="22094454" y="12594285"/>
+            <a:ext cx="895500" cy="384900"/>
+          </a:xfrm>
+          <a:prstGeom prst="rect">
+            <a:avLst/>
+          </a:prstGeom>
+          <a:noFill/>
+          <a:ln>
+            <a:noFill/>
+          </a:ln>
+        </p:spPr>
+        <p:txBody>
+          <a:bodyPr anchorCtr="0" anchor="t" bIns="38100" lIns="38100" spcFirstLastPara="1" rIns="38100" wrap="square" tIns="38100">
+            <a:spAutoFit/>
+          </a:bodyPr>
+          <a:lstStyle/>
+          <a:p>
+            <a:pPr indent="0" lvl="0" marL="0" marR="0" rtl="0" algn="ctr">
+              <a:lnSpc>
+                <a:spcPct val="100000"/>
+              </a:lnSpc>
+              <a:spcBef>
+                <a:spcPts val="0"/>
+              </a:spcBef>
+              <a:spcAft>
+                <a:spcPts val="0"/>
+              </a:spcAft>
+              <a:buClr>
+                <a:srgbClr val="000000"/>
+              </a:buClr>
+              <a:buSzPts val="2000"/>
+              <a:buFont typeface="Arial"/>
+              <a:buNone/>
+            </a:pPr>
+            <a:fld id="{00000000-1234-1234-1234-123412341234}" type="slidenum">
+              <a:rPr b="0" i="0" lang="en-US" sz="2000" u="none" cap="none" strike="noStrike">
+                <a:solidFill>
+                  <a:srgbClr val="9B9A9C"/>
+                </a:solidFill>
+                <a:latin typeface="Montserrat"/>
+                <a:ea typeface="Montserrat"/>
+                <a:cs typeface="Montserrat"/>
+                <a:sym typeface="Montserrat"/>
+              </a:rPr>
+              <a:t>‹#›</a:t>
+            </a:fld>
+            <a:endParaRPr b="0" i="0" sz="2000" u="none" cap="none" strike="noStrike">
+              <a:solidFill>
+                <a:srgbClr val="9B9A9C"/>
+              </a:solidFill>
+              <a:latin typeface="Montserrat"/>
+              <a:ea typeface="Montserrat"/>
+              <a:cs typeface="Montserrat"/>
+              <a:sym typeface="Montserrat"/>
+            </a:endParaRPr>
+          </a:p>
+        </p:txBody>
+      </p:sp>
+      <p:sp>
+        <p:nvSpPr>
+          <p:cNvPr id="200" name="Google Shape;200;p22"/>
+          <p:cNvSpPr/>
+          <p:nvPr/>
+        </p:nvSpPr>
+        <p:spPr>
+          <a:xfrm>
+            <a:off x="1396450" y="1864458"/>
+            <a:ext cx="11459100" cy="1537500"/>
+          </a:xfrm>
+          <a:prstGeom prst="rect">
+            <a:avLst/>
+          </a:prstGeom>
+          <a:noFill/>
+          <a:ln>
+            <a:noFill/>
+          </a:ln>
+        </p:spPr>
+        <p:txBody>
+          <a:bodyPr anchorCtr="0" anchor="t" bIns="45700" lIns="91425" spcFirstLastPara="1" rIns="91425" wrap="square" tIns="45700">
+            <a:noAutofit/>
+          </a:bodyPr>
+          <a:lstStyle/>
+          <a:p>
+            <a:pPr indent="0" lvl="0" marL="0" marR="0" rtl="0" algn="l">
+              <a:lnSpc>
+                <a:spcPct val="180000"/>
+              </a:lnSpc>
+              <a:spcBef>
+                <a:spcPts val="0"/>
+              </a:spcBef>
+              <a:spcAft>
+                <a:spcPts val="0"/>
+              </a:spcAft>
+              <a:buClr>
+                <a:srgbClr val="000000"/>
+              </a:buClr>
+              <a:buSzPts val="6000"/>
+              <a:buFont typeface="Arial"/>
+              <a:buNone/>
+            </a:pPr>
+            <a:r>
+              <a:t/>
+            </a:r>
+            <a:endParaRPr b="0" i="0" sz="6000" u="none" cap="none" strike="noStrike">
+              <a:solidFill>
+                <a:srgbClr val="292829"/>
+              </a:solidFill>
+              <a:latin typeface="Open Sans"/>
+              <a:ea typeface="Open Sans"/>
+              <a:cs typeface="Open Sans"/>
+              <a:sym typeface="Open Sans"/>
+            </a:endParaRPr>
+          </a:p>
+        </p:txBody>
+      </p:sp>
+      <p:sp>
+        <p:nvSpPr>
+          <p:cNvPr id="201" name="Google Shape;201;p22"/>
+          <p:cNvSpPr/>
+          <p:nvPr/>
+        </p:nvSpPr>
+        <p:spPr>
+          <a:xfrm>
+            <a:off x="1396326" y="3257600"/>
+            <a:ext cx="13789200" cy="573600"/>
+          </a:xfrm>
+          <a:prstGeom prst="rect">
+            <a:avLst/>
+          </a:prstGeom>
+          <a:noFill/>
+          <a:ln>
+            <a:noFill/>
+          </a:ln>
+        </p:spPr>
+        <p:txBody>
+          <a:bodyPr anchorCtr="0" anchor="t" bIns="45700" lIns="91425" spcFirstLastPara="1" rIns="91425" wrap="square" tIns="45700">
+            <a:noAutofit/>
+          </a:bodyPr>
+          <a:lstStyle/>
+          <a:p>
+            <a:pPr indent="0" lvl="0" marL="0" marR="0" rtl="0" algn="l">
+              <a:lnSpc>
+                <a:spcPct val="180000"/>
+              </a:lnSpc>
+              <a:spcBef>
+                <a:spcPts val="0"/>
+              </a:spcBef>
+              <a:spcAft>
+                <a:spcPts val="0"/>
+              </a:spcAft>
+              <a:buClr>
+                <a:srgbClr val="000000"/>
+              </a:buClr>
+              <a:buSzPts val="2000"/>
+              <a:buFont typeface="Arial"/>
+              <a:buNone/>
+            </a:pPr>
+            <a:r>
+              <a:t/>
+            </a:r>
+            <a:endParaRPr b="0" i="0" sz="2000" u="none" cap="none" strike="noStrike">
+              <a:solidFill>
+                <a:srgbClr val="292829"/>
+              </a:solidFill>
+              <a:latin typeface="Arial"/>
+              <a:ea typeface="Arial"/>
+              <a:cs typeface="Arial"/>
+              <a:sym typeface="Arial"/>
+            </a:endParaRPr>
+          </a:p>
+        </p:txBody>
+      </p:sp>
+      <p:sp>
+        <p:nvSpPr>
+          <p:cNvPr id="202" name="Google Shape;202;p22"/>
+          <p:cNvSpPr txBox="1"/>
+          <p:nvPr/>
+        </p:nvSpPr>
+        <p:spPr>
+          <a:xfrm>
+            <a:off x="1396325" y="1421000"/>
+            <a:ext cx="18019200" cy="1296600"/>
+          </a:xfrm>
+          <a:prstGeom prst="rect">
+            <a:avLst/>
+          </a:prstGeom>
+          <a:noFill/>
+          <a:ln>
+            <a:noFill/>
+          </a:ln>
+        </p:spPr>
+        <p:txBody>
+          <a:bodyPr anchorCtr="0" anchor="t" bIns="38100" lIns="38100" spcFirstLastPara="1" rIns="38100" wrap="square" tIns="38100">
+            <a:noAutofit/>
+          </a:bodyPr>
+          <a:lstStyle/>
+          <a:p>
+            <a:pPr indent="0" lvl="0" marL="0" marR="0" rtl="0" algn="l">
+              <a:lnSpc>
+                <a:spcPct val="100000"/>
+              </a:lnSpc>
+              <a:spcBef>
+                <a:spcPts val="0"/>
+              </a:spcBef>
+              <a:spcAft>
+                <a:spcPts val="0"/>
+              </a:spcAft>
+              <a:buClr>
+                <a:srgbClr val="000000"/>
+              </a:buClr>
+              <a:buSzPts val="6000"/>
+              <a:buFont typeface="Arial"/>
+              <a:buNone/>
+            </a:pPr>
+            <a:r>
+              <a:rPr b="1" lang="en-US" sz="7000">
+                <a:solidFill>
+                  <a:srgbClr val="406FFD"/>
+                </a:solidFill>
+                <a:latin typeface="Montserrat"/>
+                <a:ea typeface="Montserrat"/>
+                <a:cs typeface="Montserrat"/>
+                <a:sym typeface="Montserrat"/>
+              </a:rPr>
+              <a:t>Project Management</a:t>
+            </a:r>
+            <a:endParaRPr b="1" i="0" sz="7000" u="none" cap="none" strike="noStrike">
+              <a:solidFill>
+                <a:srgbClr val="FF0000"/>
+              </a:solidFill>
+              <a:latin typeface="Montserrat"/>
+              <a:ea typeface="Montserrat"/>
+              <a:cs typeface="Montserrat"/>
+              <a:sym typeface="Montserrat"/>
+            </a:endParaRPr>
+          </a:p>
+        </p:txBody>
+      </p:sp>
+      <p:sp>
+        <p:nvSpPr>
+          <p:cNvPr id="203" name="Google Shape;203;p22"/>
+          <p:cNvSpPr/>
+          <p:nvPr/>
+        </p:nvSpPr>
+        <p:spPr>
+          <a:xfrm>
+            <a:off x="1949950" y="4507350"/>
+            <a:ext cx="19062900" cy="6576000"/>
+          </a:xfrm>
+          <a:prstGeom prst="rect">
+            <a:avLst/>
+          </a:prstGeom>
+          <a:noFill/>
+          <a:ln>
+            <a:noFill/>
+          </a:ln>
+        </p:spPr>
+        <p:txBody>
+          <a:bodyPr anchorCtr="0" anchor="t" bIns="45700" lIns="91425" spcFirstLastPara="1" rIns="91425" wrap="square" tIns="45700">
+            <a:noAutofit/>
+          </a:bodyPr>
+          <a:lstStyle/>
+          <a:p>
+            <a:pPr indent="-292100" lvl="0" marL="342900" marR="0" rtl="0" algn="l">
+              <a:lnSpc>
+                <a:spcPct val="180000"/>
+              </a:lnSpc>
+              <a:spcBef>
+                <a:spcPts val="0"/>
+              </a:spcBef>
+              <a:spcAft>
+                <a:spcPts val="0"/>
+              </a:spcAft>
+              <a:buClr>
+                <a:srgbClr val="292829"/>
+              </a:buClr>
+              <a:buSzPts val="4000"/>
+              <a:buFont typeface="Century Gothic"/>
+              <a:buChar char="•"/>
+            </a:pPr>
+            <a:r>
+              <a:rPr lang="en-US" sz="4000">
+                <a:solidFill>
+                  <a:srgbClr val="292829"/>
+                </a:solidFill>
+                <a:latin typeface="Century Gothic"/>
+                <a:ea typeface="Century Gothic"/>
+                <a:cs typeface="Century Gothic"/>
+                <a:sym typeface="Century Gothic"/>
+              </a:rPr>
+              <a:t>Entire Project was managed </a:t>
+            </a:r>
+            <a:endParaRPr sz="4000">
+              <a:solidFill>
+                <a:srgbClr val="292829"/>
+              </a:solidFill>
+              <a:latin typeface="Century Gothic"/>
+              <a:ea typeface="Century Gothic"/>
+              <a:cs typeface="Century Gothic"/>
+              <a:sym typeface="Century Gothic"/>
+            </a:endParaRPr>
+          </a:p>
+          <a:p>
+            <a:pPr indent="0" lvl="0" marL="457200" marR="0" rtl="0" algn="l">
+              <a:lnSpc>
+                <a:spcPct val="180000"/>
+              </a:lnSpc>
+              <a:spcBef>
+                <a:spcPts val="0"/>
+              </a:spcBef>
+              <a:spcAft>
+                <a:spcPts val="0"/>
+              </a:spcAft>
+              <a:buNone/>
+            </a:pPr>
+            <a:r>
+              <a:rPr lang="en-US" sz="4000">
+                <a:solidFill>
+                  <a:srgbClr val="292829"/>
+                </a:solidFill>
+                <a:latin typeface="Century Gothic"/>
+                <a:ea typeface="Century Gothic"/>
+                <a:cs typeface="Century Gothic"/>
+                <a:sym typeface="Century Gothic"/>
+              </a:rPr>
+              <a:t>on Github.</a:t>
+            </a:r>
+            <a:endParaRPr sz="4000">
+              <a:solidFill>
+                <a:srgbClr val="292829"/>
+              </a:solidFill>
+              <a:latin typeface="Century Gothic"/>
+              <a:ea typeface="Century Gothic"/>
+              <a:cs typeface="Century Gothic"/>
+              <a:sym typeface="Century Gothic"/>
+            </a:endParaRPr>
+          </a:p>
+          <a:p>
+            <a:pPr indent="-292100" lvl="0" marL="342900" marR="0" rtl="0" algn="l">
+              <a:lnSpc>
+                <a:spcPct val="180000"/>
+              </a:lnSpc>
+              <a:spcBef>
+                <a:spcPts val="0"/>
+              </a:spcBef>
+              <a:spcAft>
+                <a:spcPts val="0"/>
+              </a:spcAft>
+              <a:buClr>
+                <a:srgbClr val="292829"/>
+              </a:buClr>
+              <a:buSzPts val="4000"/>
+              <a:buFont typeface="Century Gothic"/>
+              <a:buChar char="•"/>
+            </a:pPr>
+            <a:r>
+              <a:rPr lang="en-US" sz="4000">
+                <a:solidFill>
+                  <a:srgbClr val="292829"/>
+                </a:solidFill>
+                <a:latin typeface="Century Gothic"/>
+                <a:ea typeface="Century Gothic"/>
+                <a:cs typeface="Century Gothic"/>
+                <a:sym typeface="Century Gothic"/>
+              </a:rPr>
+              <a:t>Issues were created, each </a:t>
+            </a:r>
+            <a:endParaRPr sz="4000">
+              <a:solidFill>
+                <a:srgbClr val="292829"/>
+              </a:solidFill>
+              <a:latin typeface="Century Gothic"/>
+              <a:ea typeface="Century Gothic"/>
+              <a:cs typeface="Century Gothic"/>
+              <a:sym typeface="Century Gothic"/>
+            </a:endParaRPr>
+          </a:p>
+          <a:p>
+            <a:pPr indent="0" lvl="0" marL="457200" marR="0" rtl="0" algn="l">
+              <a:lnSpc>
+                <a:spcPct val="180000"/>
+              </a:lnSpc>
+              <a:spcBef>
+                <a:spcPts val="0"/>
+              </a:spcBef>
+              <a:spcAft>
+                <a:spcPts val="0"/>
+              </a:spcAft>
+              <a:buNone/>
+            </a:pPr>
+            <a:r>
+              <a:rPr lang="en-US" sz="4000">
+                <a:solidFill>
+                  <a:srgbClr val="292829"/>
+                </a:solidFill>
+                <a:latin typeface="Century Gothic"/>
+                <a:ea typeface="Century Gothic"/>
+                <a:cs typeface="Century Gothic"/>
+                <a:sym typeface="Century Gothic"/>
+              </a:rPr>
+              <a:t>primarily</a:t>
+            </a:r>
+            <a:r>
+              <a:rPr lang="en-US" sz="4000">
+                <a:solidFill>
+                  <a:srgbClr val="292829"/>
+                </a:solidFill>
+                <a:latin typeface="Century Gothic"/>
+                <a:ea typeface="Century Gothic"/>
+                <a:cs typeface="Century Gothic"/>
+                <a:sym typeface="Century Gothic"/>
+              </a:rPr>
+              <a:t> acting as a </a:t>
+            </a:r>
+            <a:endParaRPr sz="4000">
+              <a:solidFill>
+                <a:srgbClr val="292829"/>
+              </a:solidFill>
+              <a:latin typeface="Century Gothic"/>
+              <a:ea typeface="Century Gothic"/>
+              <a:cs typeface="Century Gothic"/>
+              <a:sym typeface="Century Gothic"/>
+            </a:endParaRPr>
+          </a:p>
+          <a:p>
+            <a:pPr indent="0" lvl="0" marL="457200" marR="0" rtl="0" algn="l">
+              <a:lnSpc>
+                <a:spcPct val="180000"/>
+              </a:lnSpc>
+              <a:spcBef>
+                <a:spcPts val="0"/>
+              </a:spcBef>
+              <a:spcAft>
+                <a:spcPts val="0"/>
+              </a:spcAft>
+              <a:buNone/>
+            </a:pPr>
+            <a:r>
+              <a:rPr lang="en-US" sz="4000">
+                <a:solidFill>
+                  <a:srgbClr val="292829"/>
+                </a:solidFill>
+                <a:latin typeface="Century Gothic"/>
+                <a:ea typeface="Century Gothic"/>
+                <a:cs typeface="Century Gothic"/>
+                <a:sym typeface="Century Gothic"/>
+              </a:rPr>
+              <a:t>milestone.</a:t>
+            </a:r>
+            <a:endParaRPr sz="4000">
+              <a:solidFill>
+                <a:srgbClr val="292829"/>
+              </a:solidFill>
+              <a:latin typeface="Century Gothic"/>
+              <a:ea typeface="Century Gothic"/>
+              <a:cs typeface="Century Gothic"/>
+              <a:sym typeface="Century Gothic"/>
+            </a:endParaRPr>
+          </a:p>
+          <a:p>
+            <a:pPr indent="0" lvl="0" marL="457200" marR="0" rtl="0" algn="l">
+              <a:lnSpc>
+                <a:spcPct val="180000"/>
+              </a:lnSpc>
+              <a:spcBef>
+                <a:spcPts val="0"/>
+              </a:spcBef>
+              <a:spcAft>
+                <a:spcPts val="0"/>
+              </a:spcAft>
+              <a:buNone/>
+            </a:pPr>
+            <a:r>
+              <a:t/>
+            </a:r>
+            <a:endParaRPr sz="4000">
+              <a:solidFill>
+                <a:srgbClr val="292829"/>
+              </a:solidFill>
+              <a:latin typeface="Century Gothic"/>
+              <a:ea typeface="Century Gothic"/>
+              <a:cs typeface="Century Gothic"/>
+              <a:sym typeface="Century Gothic"/>
+            </a:endParaRPr>
+          </a:p>
+        </p:txBody>
+      </p:sp>
+      <p:pic>
+        <p:nvPicPr>
+          <p:cNvPr id="204" name="Google Shape;204;p22"/>
+          <p:cNvPicPr preferRelativeResize="0"/>
+          <p:nvPr/>
+        </p:nvPicPr>
+        <p:blipFill rotWithShape="1">
+          <a:blip r:embed="rId3">
+            <a:alphaModFix/>
+          </a:blip>
+          <a:srcRect b="0" l="0" r="0" t="0"/>
+          <a:stretch/>
+        </p:blipFill>
+        <p:spPr>
+          <a:xfrm>
+            <a:off x="526783" y="12188760"/>
+            <a:ext cx="4264408" cy="1298928"/>
+          </a:xfrm>
+          <a:prstGeom prst="rect">
+            <a:avLst/>
+          </a:prstGeom>
+          <a:noFill/>
+          <a:ln>
+            <a:noFill/>
+          </a:ln>
+        </p:spPr>
+      </p:pic>
+      <p:pic>
+        <p:nvPicPr>
+          <p:cNvPr id="205" name="Google Shape;205;p22"/>
+          <p:cNvPicPr preferRelativeResize="0"/>
+          <p:nvPr/>
+        </p:nvPicPr>
+        <p:blipFill rotWithShape="1">
+          <a:blip r:embed="rId3">
+            <a:alphaModFix/>
+          </a:blip>
+          <a:srcRect b="0" l="0" r="0" t="0"/>
+          <a:stretch/>
+        </p:blipFill>
+        <p:spPr>
+          <a:xfrm>
+            <a:off x="679183" y="12341160"/>
+            <a:ext cx="4264408" cy="1298928"/>
+          </a:xfrm>
+          <a:prstGeom prst="rect">
+            <a:avLst/>
+          </a:prstGeom>
+          <a:noFill/>
+          <a:ln>
+            <a:noFill/>
+          </a:ln>
+        </p:spPr>
+      </p:pic>
+      <p:pic>
+        <p:nvPicPr>
+          <p:cNvPr id="206" name="Google Shape;206;p22"/>
+          <p:cNvPicPr preferRelativeResize="0"/>
+          <p:nvPr/>
+        </p:nvPicPr>
+        <p:blipFill>
+          <a:blip r:embed="rId4">
+            <a:alphaModFix/>
+          </a:blip>
+          <a:stretch>
+            <a:fillRect/>
+          </a:stretch>
+        </p:blipFill>
+        <p:spPr>
+          <a:xfrm>
+            <a:off x="10735475" y="3143475"/>
+            <a:ext cx="12254476" cy="9521517"/>
+          </a:xfrm>
+          <a:prstGeom prst="rect">
+            <a:avLst/>
+          </a:prstGeom>
+          <a:noFill/>
+          <a:ln>
+            <a:noFill/>
+          </a:ln>
+        </p:spPr>
+      </p:pic>
+    </p:spTree>
+  </p:cSld>
+  <p:clrMapOvr>
+    <a:masterClrMapping/>
+  </p:clrMapOvr>
+  <p:transition spd="slow">
+    <p:push/>
+  </p:transition>
+  <p:timing>
+    <p:tnLst>
+      <p:par>
+        <p:cTn dur="indefinite" nodeType="tmRoot" restart="never">
+          <p:childTnLst>
+            <p:seq concurrent="1" nextAc="seek">
+              <p:cTn dur="indefinite" id="2" nodeType="mainSeq">
+                <p:childTnLst>
+                  <p:par>
+                    <p:cTn fill="hold">
+                      <p:stCondLst>
+                        <p:cond delay="indefinite"/>
+                      </p:stCondLst>
+                      <p:childTnLst>
+                        <p:par>
+                          <p:cTn fill="hold">
+                            <p:stCondLst>
+                              <p:cond delay="0"/>
+                            </p:stCondLst>
+                            <p:childTnLst>
+                              <p:par>
+                                <p:cTn fill="hold" nodeType="clickEffect" presetClass="entr" presetID="10" presetSubtype="0">
+                                  <p:stCondLst>
+                                    <p:cond delay="0"/>
+                                  </p:stCondLst>
+                                  <p:childTnLst>
+                                    <p:set>
+                                      <p:cBhvr>
+                                        <p:cTn dur="1" fill="hold">
+                                          <p:stCondLst>
+                                            <p:cond delay="0"/>
+                                          </p:stCondLst>
+                                        </p:cTn>
+                                        <p:tgtEl>
+                                          <p:spTgt spid="203"/>
+                                        </p:tgtEl>
+                                        <p:attrNameLst>
+                                          <p:attrName>style.visibility</p:attrName>
+                                        </p:attrNameLst>
+                                      </p:cBhvr>
+                                      <p:to>
+                                        <p:strVal val="visible"/>
+                                      </p:to>
+                                    </p:set>
+                                    <p:animEffect filter="fade" transition="in">
+                                      <p:cBhvr>
+                                        <p:cTn dur="500"/>
+                                        <p:tgtEl>
+                                          <p:spTgt spid="203"/>
+                                        </p:tgtEl>
+                                      </p:cBhvr>
+                                    </p:animEffect>
+                                  </p:childTnLst>
+                                </p:cTn>
+                              </p:par>
+                            </p:childTnLst>
+                          </p:cTn>
+                        </p:par>
+                      </p:childTnLst>
+                    </p:cTn>
+                  </p:par>
+                  <p:par>
+                    <p:cTn fill="hold">
+                      <p:stCondLst>
+                        <p:cond delay="indefinite"/>
+                      </p:stCondLst>
+                      <p:childTnLst>
+                        <p:par>
+                          <p:cTn fill="hold">
+                            <p:stCondLst>
+                              <p:cond delay="0"/>
+                            </p:stCondLst>
+                            <p:childTnLst>
+                              <p:par>
+                                <p:cTn fill="hold" nodeType="clickEffect" presetClass="entr" presetID="1" presetSubtype="0">
+                                  <p:stCondLst>
+                                    <p:cond delay="0"/>
+                                  </p:stCondLst>
+                                  <p:childTnLst>
+                                    <p:set>
+                                      <p:cBhvr>
+                                        <p:cTn dur="1" fill="hold">
+                                          <p:stCondLst>
+                                            <p:cond delay="0"/>
+                                          </p:stCondLst>
+                                        </p:cTn>
+                                        <p:tgtEl>
+                                          <p:spTgt spid="206"/>
+                                        </p:tgtEl>
+                                        <p:attrNameLst>
+                                          <p:attrName>style.visibility</p:attrName>
+                                        </p:attrNameLst>
+                                      </p:cBhvr>
+                                      <p:to>
+                                        <p:strVal val="visible"/>
+                                      </p:to>
+                                    </p:set>
+                                  </p:childTnLst>
+                                </p:cTn>
+                              </p:par>
+                            </p:childTnLst>
+                          </p:cTn>
+                        </p:par>
+                      </p:childTnLst>
+                    </p:cTn>
+                  </p:par>
+                </p:childTnLst>
+              </p:cTn>
+              <p:prevCondLst>
+                <p:cond evt="onPrev">
+                  <p:tgtEl>
+                    <p:sldTgt/>
+                  </p:tgtEl>
+                </p:cond>
+              </p:prevCondLst>
+              <p:nextCondLst>
+                <p:cond evt="onNext">
+                  <p:tgtEl>
+                    <p:sldTgt/>
+                  </p:tgtEl>
+                </p:cond>
+              </p:nextCondLst>
+            </p:seq>
+          </p:childTnLst>
+        </p:cTn>
+      </p:par>
+    </p:tnLst>
+  </p:timing>
+</p:sld>
+</file>
+
+<file path=ppt/slides/slide16.xml><?xml version="1.0" encoding="utf-8"?>
+<p:sld xmlns:a="http://schemas.openxmlformats.org/drawingml/2006/main" xmlns:r="http://schemas.openxmlformats.org/officeDocument/2006/relationships" xmlns:mc="http://schemas.openxmlformats.org/markup-compatibility/2006" xmlns:mv="urn:schemas-microsoft-com:mac:vml" xmlns:p="http://schemas.openxmlformats.org/presentationml/2006/main" xmlns:c="http://schemas.openxmlformats.org/drawingml/2006/chart" xmlns:dgm="http://schemas.openxmlformats.org/drawingml/2006/diagram" xmlns:o="urn:schemas-microsoft-com:office:office" xmlns:v="urn:schemas-microsoft-com:vml" xmlns:pvml="urn:schemas-microsoft-com:office:powerpoint" xmlns:com="http://schemas.openxmlformats.org/drawingml/2006/compatibility" xmlns:p14="http://schemas.microsoft.com/office/powerpoint/2010/main" xmlns:p15="http://schemas.microsoft.com/office/powerpoint/2012/main" xmlns:ahyp="http://schemas.microsoft.com/office/drawing/2018/hyperlinkcolor">
+  <p:cSld>
+    <p:spTree>
+      <p:nvGrpSpPr>
+        <p:cNvPr id="210" name="Shape 210"/>
+        <p:cNvGrpSpPr/>
+        <p:nvPr/>
+      </p:nvGrpSpPr>
+      <p:grpSpPr>
+        <a:xfrm>
+          <a:off x="0" y="0"/>
+          <a:ext cx="0" cy="0"/>
+          <a:chOff x="0" y="0"/>
+          <a:chExt cx="0" cy="0"/>
+        </a:xfrm>
+      </p:grpSpPr>
+      <p:sp>
+        <p:nvSpPr>
+          <p:cNvPr id="211" name="Google Shape;211;p23"/>
           <p:cNvSpPr txBox="1"/>
           <p:nvPr/>
         </p:nvSpPr>
@@ -10926,7 +11737,7 @@
       </p:sp>
       <p:grpSp>
         <p:nvGrpSpPr>
-          <p:cNvPr id="199" name="Google Shape;199;p22"/>
+          <p:cNvPr id="212" name="Google Shape;212;p23"/>
           <p:cNvGrpSpPr/>
           <p:nvPr/>
         </p:nvGrpSpPr>
@@ -10940,7 +11751,7 @@
         </p:grpSpPr>
         <p:sp>
           <p:nvSpPr>
-            <p:cNvPr id="200" name="Google Shape;200;p22"/>
+            <p:cNvPr id="213" name="Google Shape;213;p23"/>
             <p:cNvSpPr txBox="1"/>
             <p:nvPr/>
           </p:nvSpPr>
@@ -11006,7 +11817,7 @@
         </p:sp>
         <p:sp>
           <p:nvSpPr>
-            <p:cNvPr id="201" name="Google Shape;201;p22"/>
+            <p:cNvPr id="214" name="Google Shape;214;p23"/>
             <p:cNvSpPr/>
             <p:nvPr/>
           </p:nvSpPr>
@@ -11064,7 +11875,7 @@
       </p:grpSp>
       <p:sp>
         <p:nvSpPr>
-          <p:cNvPr id="202" name="Google Shape;202;p22"/>
+          <p:cNvPr id="215" name="Google Shape;215;p23"/>
           <p:cNvSpPr/>
           <p:nvPr/>
         </p:nvSpPr>
@@ -11121,7 +11932,7 @@
       </p:sp>
       <p:sp>
         <p:nvSpPr>
-          <p:cNvPr id="203" name="Google Shape;203;p22"/>
+          <p:cNvPr id="216" name="Google Shape;216;p23"/>
           <p:cNvSpPr/>
           <p:nvPr/>
         </p:nvSpPr>
@@ -11412,7 +12223,7 @@
       </p:sp>
       <p:pic>
         <p:nvPicPr>
-          <p:cNvPr id="204" name="Google Shape;204;p22"/>
+          <p:cNvPr id="217" name="Google Shape;217;p23"/>
           <p:cNvPicPr preferRelativeResize="0"/>
           <p:nvPr/>
         </p:nvPicPr>
@@ -11479,7 +12290,7 @@
                                           </p:stCondLst>
                                         </p:cTn>
                                         <p:tgtEl>
-                                          <p:spTgt spid="199"/>
+                                          <p:spTgt spid="212"/>
                                         </p:tgtEl>
                                         <p:attrNameLst>
                                           <p:attrName>style.visibility</p:attrName>
@@ -11493,7 +12304,7 @@
                                       <p:cBhvr additive="base">
                                         <p:cTn dur="500"/>
                                         <p:tgtEl>
-                                          <p:spTgt spid="199"/>
+                                          <p:spTgt spid="212"/>
                                         </p:tgtEl>
                                         <p:attrNameLst>
                                           <p:attrName>ppt_x</p:attrName>
@@ -11547,7 +12358,7 @@
                                           </p:stCondLst>
                                         </p:cTn>
                                         <p:tgtEl>
-                                          <p:spTgt spid="203"/>
+                                          <p:spTgt spid="216"/>
                                         </p:tgtEl>
                                         <p:attrNameLst>
                                           <p:attrName>style.visibility</p:attrName>
@@ -11591,12 +12402,12 @@
 </p:sld>
 </file>
 
-<file path=ppt/slides/slide16.xml><?xml version="1.0" encoding="utf-8"?>
+<file path=ppt/slides/slide17.xml><?xml version="1.0" encoding="utf-8"?>
 <p:sld xmlns:a="http://schemas.openxmlformats.org/drawingml/2006/main" xmlns:r="http://schemas.openxmlformats.org/officeDocument/2006/relationships" xmlns:mc="http://schemas.openxmlformats.org/markup-compatibility/2006" xmlns:mv="urn:schemas-microsoft-com:mac:vml" xmlns:p="http://schemas.openxmlformats.org/presentationml/2006/main" xmlns:c="http://schemas.openxmlformats.org/drawingml/2006/chart" xmlns:dgm="http://schemas.openxmlformats.org/drawingml/2006/diagram" xmlns:o="urn:schemas-microsoft-com:office:office" xmlns:v="urn:schemas-microsoft-com:vml" xmlns:pvml="urn:schemas-microsoft-com:office:powerpoint" xmlns:com="http://schemas.openxmlformats.org/drawingml/2006/compatibility" xmlns:p14="http://schemas.microsoft.com/office/powerpoint/2010/main" xmlns:p15="http://schemas.microsoft.com/office/powerpoint/2012/main" xmlns:ahyp="http://schemas.microsoft.com/office/drawing/2018/hyperlinkcolor">
   <p:cSld>
     <p:spTree>
       <p:nvGrpSpPr>
-        <p:cNvPr id="208" name="Shape 208"/>
+        <p:cNvPr id="221" name="Shape 221"/>
         <p:cNvGrpSpPr/>
         <p:nvPr/>
       </p:nvGrpSpPr>
@@ -11610,7 +12421,7 @@
       </p:grpSpPr>
       <p:sp>
         <p:nvSpPr>
-          <p:cNvPr id="209" name="Google Shape;209;p23"/>
+          <p:cNvPr id="222" name="Google Shape;222;p24"/>
           <p:cNvSpPr txBox="1"/>
           <p:nvPr>
             <p:ph type="ctrTitle"/>
@@ -13585,7 +14396,7 @@
             <a:tbl>
               <a:tblPr bandRow="1" firstRow="1">
                 <a:noFill/>
-                <a:tableStyleId>{7306B686-567A-411E-B08C-D86AB1C8947E}</a:tableStyleId>
+                <a:tableStyleId>{C60415E6-8FCA-4A44-9722-51C990FFCC4B}</a:tableStyleId>
               </a:tblPr>
               <a:tblGrid>
                 <a:gridCol w="6166150"/>
@@ -16272,6 +17083,285 @@
 </file>
 
 <file path=ppt/theme/theme1.xml><?xml version="1.0" encoding="utf-8"?>
+<a:theme xmlns:a="http://schemas.openxmlformats.org/drawingml/2006/main" xmlns:r="http://schemas.openxmlformats.org/officeDocument/2006/relationships" name="White">
+  <a:themeElements>
+    <a:clrScheme name="W-Blue">
+      <a:dk1>
+        <a:srgbClr val="292729"/>
+      </a:dk1>
+      <a:lt1>
+        <a:srgbClr val="FDFCFF"/>
+      </a:lt1>
+      <a:dk2>
+        <a:srgbClr val="000000"/>
+      </a:dk2>
+      <a:lt2>
+        <a:srgbClr val="FEFFFF"/>
+      </a:lt2>
+      <a:accent1>
+        <a:srgbClr val="F0F4F7"/>
+      </a:accent1>
+      <a:accent2>
+        <a:srgbClr val="C3CBD0"/>
+      </a:accent2>
+      <a:accent3>
+        <a:srgbClr val="406FFD"/>
+      </a:accent3>
+      <a:accent4>
+        <a:srgbClr val="406FFD"/>
+      </a:accent4>
+      <a:accent5>
+        <a:srgbClr val="406FFD"/>
+      </a:accent5>
+      <a:accent6>
+        <a:srgbClr val="406FFD"/>
+      </a:accent6>
+      <a:hlink>
+        <a:srgbClr val="406FFD"/>
+      </a:hlink>
+      <a:folHlink>
+        <a:srgbClr val="3661DF"/>
+      </a:folHlink>
+    </a:clrScheme>
+    <a:fontScheme name="Office">
+      <a:majorFont>
+        <a:latin typeface="Arial"/>
+        <a:ea typeface=""/>
+        <a:cs typeface=""/>
+        <a:font script="Jpan" typeface="ＭＳ Ｐゴシック"/>
+        <a:font script="Hang" typeface="맑은 고딕"/>
+        <a:font script="Hans" typeface="宋体"/>
+        <a:font script="Hant" typeface="新細明體"/>
+        <a:font script="Arab" typeface="Times New Roman"/>
+        <a:font script="Hebr" typeface="Times New Roman"/>
+        <a:font script="Thai" typeface="Angsana New"/>
+        <a:font script="Ethi" typeface="Nyala"/>
+        <a:font script="Beng" typeface="Vrinda"/>
+        <a:font script="Gujr" typeface="Shruti"/>
+        <a:font script="Khmr" typeface="MoolBoran"/>
+        <a:font script="Knda" typeface="Tunga"/>
+        <a:font script="Guru" typeface="Raavi"/>
+        <a:font script="Cans" typeface="Euphemia"/>
+        <a:font script="Cher" typeface="Plantagenet Cherokee"/>
+        <a:font script="Yiii" typeface="Microsoft Yi Baiti"/>
+        <a:font script="Tibt" typeface="Microsoft Himalaya"/>
+        <a:font script="Thaa" typeface="MV Boli"/>
+        <a:font script="Deva" typeface="Mangal"/>
+        <a:font script="Telu" typeface="Gautami"/>
+        <a:font script="Taml" typeface="Latha"/>
+        <a:font script="Syrc" typeface="Estrangelo Edessa"/>
+        <a:font script="Orya" typeface="Kalinga"/>
+        <a:font script="Mlym" typeface="Kartika"/>
+        <a:font script="Laoo" typeface="DokChampa"/>
+        <a:font script="Sinh" typeface="Iskoola Pota"/>
+        <a:font script="Mong" typeface="Mongolian Baiti"/>
+        <a:font script="Viet" typeface="Times New Roman"/>
+        <a:font script="Uigh" typeface="Microsoft Uighur"/>
+        <a:font script="Geor" typeface="Sylfaen"/>
+      </a:majorFont>
+      <a:minorFont>
+        <a:latin typeface="Arial"/>
+        <a:ea typeface=""/>
+        <a:cs typeface=""/>
+        <a:font script="Jpan" typeface="ＭＳ Ｐゴシック"/>
+        <a:font script="Hang" typeface="맑은 고딕"/>
+        <a:font script="Hans" typeface="宋体"/>
+        <a:font script="Hant" typeface="新細明體"/>
+        <a:font script="Arab" typeface="Arial"/>
+        <a:font script="Hebr" typeface="Arial"/>
+        <a:font script="Thai" typeface="Cordia New"/>
+        <a:font script="Ethi" typeface="Nyala"/>
+        <a:font script="Beng" typeface="Vrinda"/>
+        <a:font script="Gujr" typeface="Shruti"/>
+        <a:font script="Khmr" typeface="DaunPenh"/>
+        <a:font script="Knda" typeface="Tunga"/>
+        <a:font script="Guru" typeface="Raavi"/>
+        <a:font script="Cans" typeface="Euphemia"/>
+        <a:font script="Cher" typeface="Plantagenet Cherokee"/>
+        <a:font script="Yiii" typeface="Microsoft Yi Baiti"/>
+        <a:font script="Tibt" typeface="Microsoft Himalaya"/>
+        <a:font script="Thaa" typeface="MV Boli"/>
+        <a:font script="Deva" typeface="Mangal"/>
+        <a:font script="Telu" typeface="Gautami"/>
+        <a:font script="Taml" typeface="Latha"/>
+        <a:font script="Syrc" typeface="Estrangelo Edessa"/>
+        <a:font script="Orya" typeface="Kalinga"/>
+        <a:font script="Mlym" typeface="Kartika"/>
+        <a:font script="Laoo" typeface="DokChampa"/>
+        <a:font script="Sinh" typeface="Iskoola Pota"/>
+        <a:font script="Mong" typeface="Mongolian Baiti"/>
+        <a:font script="Viet" typeface="Arial"/>
+        <a:font script="Uigh" typeface="Microsoft Uighur"/>
+        <a:font script="Geor" typeface="Sylfaen"/>
+      </a:minorFont>
+    </a:fontScheme>
+    <a:fmtScheme name="Office">
+      <a:fillStyleLst>
+        <a:solidFill>
+          <a:schemeClr val="phClr"/>
+        </a:solidFill>
+        <a:gradFill rotWithShape="1">
+          <a:gsLst>
+            <a:gs pos="0">
+              <a:schemeClr val="phClr">
+                <a:tint val="50000"/>
+                <a:satMod val="300000"/>
+              </a:schemeClr>
+            </a:gs>
+            <a:gs pos="35000">
+              <a:schemeClr val="phClr">
+                <a:tint val="37000"/>
+                <a:satMod val="300000"/>
+              </a:schemeClr>
+            </a:gs>
+            <a:gs pos="100000">
+              <a:schemeClr val="phClr">
+                <a:tint val="15000"/>
+                <a:satMod val="350000"/>
+              </a:schemeClr>
+            </a:gs>
+          </a:gsLst>
+          <a:lin ang="16200000" scaled="1"/>
+        </a:gradFill>
+        <a:gradFill rotWithShape="1">
+          <a:gsLst>
+            <a:gs pos="0">
+              <a:schemeClr val="phClr">
+                <a:tint val="100000"/>
+                <a:shade val="100000"/>
+                <a:satMod val="130000"/>
+              </a:schemeClr>
+            </a:gs>
+            <a:gs pos="100000">
+              <a:schemeClr val="phClr">
+                <a:tint val="50000"/>
+                <a:shade val="100000"/>
+                <a:satMod val="350000"/>
+              </a:schemeClr>
+            </a:gs>
+          </a:gsLst>
+          <a:lin ang="16200000" scaled="0"/>
+        </a:gradFill>
+      </a:fillStyleLst>
+      <a:lnStyleLst>
+        <a:ln w="9525" cap="flat" cmpd="sng" algn="ctr">
+          <a:solidFill>
+            <a:schemeClr val="phClr">
+              <a:shade val="95000"/>
+              <a:satMod val="105000"/>
+            </a:schemeClr>
+          </a:solidFill>
+          <a:prstDash val="solid"/>
+        </a:ln>
+        <a:ln w="25400" cap="flat" cmpd="sng" algn="ctr">
+          <a:solidFill>
+            <a:schemeClr val="phClr"/>
+          </a:solidFill>
+          <a:prstDash val="solid"/>
+        </a:ln>
+        <a:ln w="38100" cap="flat" cmpd="sng" algn="ctr">
+          <a:solidFill>
+            <a:schemeClr val="phClr"/>
+          </a:solidFill>
+          <a:prstDash val="solid"/>
+        </a:ln>
+      </a:lnStyleLst>
+      <a:effectStyleLst>
+        <a:effectStyle>
+          <a:effectLst>
+            <a:outerShdw blurRad="40000" dist="20000" dir="5400000" rotWithShape="0">
+              <a:srgbClr val="000000">
+                <a:alpha val="38000"/>
+              </a:srgbClr>
+            </a:outerShdw>
+          </a:effectLst>
+        </a:effectStyle>
+        <a:effectStyle>
+          <a:effectLst>
+            <a:outerShdw blurRad="40000" dist="23000" dir="5400000" rotWithShape="0">
+              <a:srgbClr val="000000">
+                <a:alpha val="35000"/>
+              </a:srgbClr>
+            </a:outerShdw>
+          </a:effectLst>
+        </a:effectStyle>
+        <a:effectStyle>
+          <a:effectLst>
+            <a:outerShdw blurRad="40000" dist="23000" dir="5400000" rotWithShape="0">
+              <a:srgbClr val="000000">
+                <a:alpha val="35000"/>
+              </a:srgbClr>
+            </a:outerShdw>
+          </a:effectLst>
+          <a:scene3d>
+            <a:camera prst="orthographicFront">
+              <a:rot lat="0" lon="0" rev="0"/>
+            </a:camera>
+            <a:lightRig rig="threePt" dir="t">
+              <a:rot lat="0" lon="0" rev="1200000"/>
+            </a:lightRig>
+          </a:scene3d>
+          <a:sp3d>
+            <a:bevelT w="63500" h="25400"/>
+          </a:sp3d>
+        </a:effectStyle>
+      </a:effectStyleLst>
+      <a:bgFillStyleLst>
+        <a:solidFill>
+          <a:schemeClr val="phClr"/>
+        </a:solidFill>
+        <a:gradFill rotWithShape="1">
+          <a:gsLst>
+            <a:gs pos="0">
+              <a:schemeClr val="phClr">
+                <a:tint val="40000"/>
+                <a:satMod val="350000"/>
+              </a:schemeClr>
+            </a:gs>
+            <a:gs pos="40000">
+              <a:schemeClr val="phClr">
+                <a:tint val="45000"/>
+                <a:shade val="99000"/>
+                <a:satMod val="350000"/>
+              </a:schemeClr>
+            </a:gs>
+            <a:gs pos="100000">
+              <a:schemeClr val="phClr">
+                <a:shade val="20000"/>
+                <a:satMod val="255000"/>
+              </a:schemeClr>
+            </a:gs>
+          </a:gsLst>
+          <a:path path="circle">
+            <a:fillToRect l="50000" t="-80000" r="50000" b="180000"/>
+          </a:path>
+        </a:gradFill>
+        <a:gradFill rotWithShape="1">
+          <a:gsLst>
+            <a:gs pos="0">
+              <a:schemeClr val="phClr">
+                <a:tint val="80000"/>
+                <a:satMod val="300000"/>
+              </a:schemeClr>
+            </a:gs>
+            <a:gs pos="100000">
+              <a:schemeClr val="phClr">
+                <a:shade val="30000"/>
+                <a:satMod val="200000"/>
+              </a:schemeClr>
+            </a:gs>
+          </a:gsLst>
+          <a:path path="circle">
+            <a:fillToRect l="50000" t="50000" r="50000" b="50000"/>
+          </a:path>
+        </a:gradFill>
+      </a:bgFillStyleLst>
+    </a:fmtScheme>
+  </a:themeElements>
+</a:theme>
+</file>
+
+<file path=ppt/theme/theme2.xml><?xml version="1.0" encoding="utf-8"?>
 <a:theme xmlns:a="http://schemas.openxmlformats.org/drawingml/2006/main" xmlns:r="http://schemas.openxmlformats.org/officeDocument/2006/relationships" name="Office Theme">
   <a:themeElements>
     <a:clrScheme name="">
@@ -16548,283 +17638,4 @@
     </a:fmtScheme>
   </a:themeElements>
 </a:theme>
-</file>
-
-<file path=ppt/theme/theme2.xml><?xml version="1.0" encoding="utf-8"?>
-<a:theme xmlns:a="http://schemas.openxmlformats.org/drawingml/2006/main" xmlns:r="http://schemas.openxmlformats.org/officeDocument/2006/relationships" name="White">
-  <a:themeElements>
-    <a:clrScheme name="W-Blue">
-      <a:dk1>
-        <a:srgbClr val="292729"/>
-      </a:dk1>
-      <a:lt1>
-        <a:srgbClr val="FDFCFF"/>
-      </a:lt1>
-      <a:dk2>
-        <a:srgbClr val="000000"/>
-      </a:dk2>
-      <a:lt2>
-        <a:srgbClr val="FEFFFF"/>
-      </a:lt2>
-      <a:accent1>
-        <a:srgbClr val="F0F4F7"/>
-      </a:accent1>
-      <a:accent2>
-        <a:srgbClr val="C3CBD0"/>
-      </a:accent2>
-      <a:accent3>
-        <a:srgbClr val="406FFD"/>
-      </a:accent3>
-      <a:accent4>
-        <a:srgbClr val="406FFD"/>
-      </a:accent4>
-      <a:accent5>
-        <a:srgbClr val="406FFD"/>
-      </a:accent5>
-      <a:accent6>
-        <a:srgbClr val="406FFD"/>
-      </a:accent6>
-      <a:hlink>
-        <a:srgbClr val="406FFD"/>
-      </a:hlink>
-      <a:folHlink>
-        <a:srgbClr val="3661DF"/>
-      </a:folHlink>
-    </a:clrScheme>
-    <a:fontScheme name="Office">
-      <a:majorFont>
-        <a:latin typeface="Arial"/>
-        <a:ea typeface=""/>
-        <a:cs typeface=""/>
-        <a:font script="Jpan" typeface="ＭＳ Ｐゴシック"/>
-        <a:font script="Hang" typeface="맑은 고딕"/>
-        <a:font script="Hans" typeface="宋体"/>
-        <a:font script="Hant" typeface="新細明體"/>
-        <a:font script="Arab" typeface="Times New Roman"/>
-        <a:font script="Hebr" typeface="Times New Roman"/>
-        <a:font script="Thai" typeface="Angsana New"/>
-        <a:font script="Ethi" typeface="Nyala"/>
-        <a:font script="Beng" typeface="Vrinda"/>
-        <a:font script="Gujr" typeface="Shruti"/>
-        <a:font script="Khmr" typeface="MoolBoran"/>
-        <a:font script="Knda" typeface="Tunga"/>
-        <a:font script="Guru" typeface="Raavi"/>
-        <a:font script="Cans" typeface="Euphemia"/>
-        <a:font script="Cher" typeface="Plantagenet Cherokee"/>
-        <a:font script="Yiii" typeface="Microsoft Yi Baiti"/>
-        <a:font script="Tibt" typeface="Microsoft Himalaya"/>
-        <a:font script="Thaa" typeface="MV Boli"/>
-        <a:font script="Deva" typeface="Mangal"/>
-        <a:font script="Telu" typeface="Gautami"/>
-        <a:font script="Taml" typeface="Latha"/>
-        <a:font script="Syrc" typeface="Estrangelo Edessa"/>
-        <a:font script="Orya" typeface="Kalinga"/>
-        <a:font script="Mlym" typeface="Kartika"/>
-        <a:font script="Laoo" typeface="DokChampa"/>
-        <a:font script="Sinh" typeface="Iskoola Pota"/>
-        <a:font script="Mong" typeface="Mongolian Baiti"/>
-        <a:font script="Viet" typeface="Times New Roman"/>
-        <a:font script="Uigh" typeface="Microsoft Uighur"/>
-        <a:font script="Geor" typeface="Sylfaen"/>
-      </a:majorFont>
-      <a:minorFont>
-        <a:latin typeface="Arial"/>
-        <a:ea typeface=""/>
-        <a:cs typeface=""/>
-        <a:font script="Jpan" typeface="ＭＳ Ｐゴシック"/>
-        <a:font script="Hang" typeface="맑은 고딕"/>
-        <a:font script="Hans" typeface="宋体"/>
-        <a:font script="Hant" typeface="新細明體"/>
-        <a:font script="Arab" typeface="Arial"/>
-        <a:font script="Hebr" typeface="Arial"/>
-        <a:font script="Thai" typeface="Cordia New"/>
-        <a:font script="Ethi" typeface="Nyala"/>
-        <a:font script="Beng" typeface="Vrinda"/>
-        <a:font script="Gujr" typeface="Shruti"/>
-        <a:font script="Khmr" typeface="DaunPenh"/>
-        <a:font script="Knda" typeface="Tunga"/>
-        <a:font script="Guru" typeface="Raavi"/>
-        <a:font script="Cans" typeface="Euphemia"/>
-        <a:font script="Cher" typeface="Plantagenet Cherokee"/>
-        <a:font script="Yiii" typeface="Microsoft Yi Baiti"/>
-        <a:font script="Tibt" typeface="Microsoft Himalaya"/>
-        <a:font script="Thaa" typeface="MV Boli"/>
-        <a:font script="Deva" typeface="Mangal"/>
-        <a:font script="Telu" typeface="Gautami"/>
-        <a:font script="Taml" typeface="Latha"/>
-        <a:font script="Syrc" typeface="Estrangelo Edessa"/>
-        <a:font script="Orya" typeface="Kalinga"/>
-        <a:font script="Mlym" typeface="Kartika"/>
-        <a:font script="Laoo" typeface="DokChampa"/>
-        <a:font script="Sinh" typeface="Iskoola Pota"/>
-        <a:font script="Mong" typeface="Mongolian Baiti"/>
-        <a:font script="Viet" typeface="Arial"/>
-        <a:font script="Uigh" typeface="Microsoft Uighur"/>
-        <a:font script="Geor" typeface="Sylfaen"/>
-      </a:minorFont>
-    </a:fontScheme>
-    <a:fmtScheme name="Office">
-      <a:fillStyleLst>
-        <a:solidFill>
-          <a:schemeClr val="phClr"/>
-        </a:solidFill>
-        <a:gradFill rotWithShape="1">
-          <a:gsLst>
-            <a:gs pos="0">
-              <a:schemeClr val="phClr">
-                <a:tint val="50000"/>
-                <a:satMod val="300000"/>
-              </a:schemeClr>
-            </a:gs>
-            <a:gs pos="35000">
-              <a:schemeClr val="phClr">
-                <a:tint val="37000"/>
-                <a:satMod val="300000"/>
-              </a:schemeClr>
-            </a:gs>
-            <a:gs pos="100000">
-              <a:schemeClr val="phClr">
-                <a:tint val="15000"/>
-                <a:satMod val="350000"/>
-              </a:schemeClr>
-            </a:gs>
-          </a:gsLst>
-          <a:lin ang="16200000" scaled="1"/>
-        </a:gradFill>
-        <a:gradFill rotWithShape="1">
-          <a:gsLst>
-            <a:gs pos="0">
-              <a:schemeClr val="phClr">
-                <a:tint val="100000"/>
-                <a:shade val="100000"/>
-                <a:satMod val="130000"/>
-              </a:schemeClr>
-            </a:gs>
-            <a:gs pos="100000">
-              <a:schemeClr val="phClr">
-                <a:tint val="50000"/>
-                <a:shade val="100000"/>
-                <a:satMod val="350000"/>
-              </a:schemeClr>
-            </a:gs>
-          </a:gsLst>
-          <a:lin ang="16200000" scaled="0"/>
-        </a:gradFill>
-      </a:fillStyleLst>
-      <a:lnStyleLst>
-        <a:ln w="9525" cap="flat" cmpd="sng" algn="ctr">
-          <a:solidFill>
-            <a:schemeClr val="phClr">
-              <a:shade val="95000"/>
-              <a:satMod val="105000"/>
-            </a:schemeClr>
-          </a:solidFill>
-          <a:prstDash val="solid"/>
-        </a:ln>
-        <a:ln w="25400" cap="flat" cmpd="sng" algn="ctr">
-          <a:solidFill>
-            <a:schemeClr val="phClr"/>
-          </a:solidFill>
-          <a:prstDash val="solid"/>
-        </a:ln>
-        <a:ln w="38100" cap="flat" cmpd="sng" algn="ctr">
-          <a:solidFill>
-            <a:schemeClr val="phClr"/>
-          </a:solidFill>
-          <a:prstDash val="solid"/>
-        </a:ln>
-      </a:lnStyleLst>
-      <a:effectStyleLst>
-        <a:effectStyle>
-          <a:effectLst>
-            <a:outerShdw blurRad="40000" dist="20000" dir="5400000" rotWithShape="0">
-              <a:srgbClr val="000000">
-                <a:alpha val="38000"/>
-              </a:srgbClr>
-            </a:outerShdw>
-          </a:effectLst>
-        </a:effectStyle>
-        <a:effectStyle>
-          <a:effectLst>
-            <a:outerShdw blurRad="40000" dist="23000" dir="5400000" rotWithShape="0">
-              <a:srgbClr val="000000">
-                <a:alpha val="35000"/>
-              </a:srgbClr>
-            </a:outerShdw>
-          </a:effectLst>
-        </a:effectStyle>
-        <a:effectStyle>
-          <a:effectLst>
-            <a:outerShdw blurRad="40000" dist="23000" dir="5400000" rotWithShape="0">
-              <a:srgbClr val="000000">
-                <a:alpha val="35000"/>
-              </a:srgbClr>
-            </a:outerShdw>
-          </a:effectLst>
-          <a:scene3d>
-            <a:camera prst="orthographicFront">
-              <a:rot lat="0" lon="0" rev="0"/>
-            </a:camera>
-            <a:lightRig rig="threePt" dir="t">
-              <a:rot lat="0" lon="0" rev="1200000"/>
-            </a:lightRig>
-          </a:scene3d>
-          <a:sp3d>
-            <a:bevelT w="63500" h="25400"/>
-          </a:sp3d>
-        </a:effectStyle>
-      </a:effectStyleLst>
-      <a:bgFillStyleLst>
-        <a:solidFill>
-          <a:schemeClr val="phClr"/>
-        </a:solidFill>
-        <a:gradFill rotWithShape="1">
-          <a:gsLst>
-            <a:gs pos="0">
-              <a:schemeClr val="phClr">
-                <a:tint val="40000"/>
-                <a:satMod val="350000"/>
-              </a:schemeClr>
-            </a:gs>
-            <a:gs pos="40000">
-              <a:schemeClr val="phClr">
-                <a:tint val="45000"/>
-                <a:shade val="99000"/>
-                <a:satMod val="350000"/>
-              </a:schemeClr>
-            </a:gs>
-            <a:gs pos="100000">
-              <a:schemeClr val="phClr">
-                <a:shade val="20000"/>
-                <a:satMod val="255000"/>
-              </a:schemeClr>
-            </a:gs>
-          </a:gsLst>
-          <a:path path="circle">
-            <a:fillToRect l="50000" t="-80000" r="50000" b="180000"/>
-          </a:path>
-        </a:gradFill>
-        <a:gradFill rotWithShape="1">
-          <a:gsLst>
-            <a:gs pos="0">
-              <a:schemeClr val="phClr">
-                <a:tint val="80000"/>
-                <a:satMod val="300000"/>
-              </a:schemeClr>
-            </a:gs>
-            <a:gs pos="100000">
-              <a:schemeClr val="phClr">
-                <a:shade val="30000"/>
-                <a:satMod val="200000"/>
-              </a:schemeClr>
-            </a:gs>
-          </a:gsLst>
-          <a:path path="circle">
-            <a:fillToRect l="50000" t="50000" r="50000" b="50000"/>
-          </a:path>
-        </a:gradFill>
-      </a:bgFillStyleLst>
-    </a:fmtScheme>
-  </a:themeElements>
-</a:theme>
 </file>
</xml_diff>